<commit_message>
Added bunch of ppt files
Startup funding, Sin/Cos, Recursion, Net Neutrality, Java Primitives, Tips for CS Freshmen
</commit_message>
<xml_diff>
--- a/Tips for CS Freshmen.pptx
+++ b/Tips for CS Freshmen.pptx
@@ -5,7 +5,7 @@
     <p:sldMasterId id="2147483648" r:id="rId1"/>
   </p:sldMasterIdLst>
   <p:sldIdLst>
-    <p:sldId id="268" r:id="rId2"/>
+    <p:sldId id="256" r:id="rId2"/>
     <p:sldId id="260" r:id="rId3"/>
     <p:sldId id="257" r:id="rId4"/>
     <p:sldId id="262" r:id="rId5"/>
@@ -14,8 +14,7 @@
     <p:sldId id="264" r:id="rId8"/>
     <p:sldId id="265" r:id="rId9"/>
     <p:sldId id="266" r:id="rId10"/>
-    <p:sldId id="269" r:id="rId11"/>
-    <p:sldId id="267" r:id="rId12"/>
+    <p:sldId id="267" r:id="rId11"/>
   </p:sldIdLst>
   <p:sldSz cx="9144000" cy="5143500" type="screen16x9"/>
   <p:notesSz cx="6858000" cy="9144000"/>
@@ -298,7 +297,7 @@
           <a:p>
             <a:fld id="{61FD3517-842E-4A76-9AF7-7F80C1AFB4A2}" type="datetimeFigureOut">
               <a:rPr lang="en-US" smtClean="0"/>
-              <a:t>11/22/2017</a:t>
+              <a:t>11/16/2017</a:t>
             </a:fld>
             <a:endParaRPr lang="en-US"/>
           </a:p>
@@ -468,7 +467,7 @@
           <a:p>
             <a:fld id="{61FD3517-842E-4A76-9AF7-7F80C1AFB4A2}" type="datetimeFigureOut">
               <a:rPr lang="en-US" smtClean="0"/>
-              <a:t>11/22/2017</a:t>
+              <a:t>11/16/2017</a:t>
             </a:fld>
             <a:endParaRPr lang="en-US"/>
           </a:p>
@@ -648,7 +647,7 @@
           <a:p>
             <a:fld id="{61FD3517-842E-4A76-9AF7-7F80C1AFB4A2}" type="datetimeFigureOut">
               <a:rPr lang="en-US" smtClean="0"/>
-              <a:t>11/22/2017</a:t>
+              <a:t>11/16/2017</a:t>
             </a:fld>
             <a:endParaRPr lang="en-US"/>
           </a:p>
@@ -818,7 +817,7 @@
           <a:p>
             <a:fld id="{61FD3517-842E-4A76-9AF7-7F80C1AFB4A2}" type="datetimeFigureOut">
               <a:rPr lang="en-US" smtClean="0"/>
-              <a:t>11/22/2017</a:t>
+              <a:t>11/16/2017</a:t>
             </a:fld>
             <a:endParaRPr lang="en-US"/>
           </a:p>
@@ -1064,7 +1063,7 @@
           <a:p>
             <a:fld id="{61FD3517-842E-4A76-9AF7-7F80C1AFB4A2}" type="datetimeFigureOut">
               <a:rPr lang="en-US" smtClean="0"/>
-              <a:t>11/22/2017</a:t>
+              <a:t>11/16/2017</a:t>
             </a:fld>
             <a:endParaRPr lang="en-US"/>
           </a:p>
@@ -1352,7 +1351,7 @@
           <a:p>
             <a:fld id="{61FD3517-842E-4A76-9AF7-7F80C1AFB4A2}" type="datetimeFigureOut">
               <a:rPr lang="en-US" smtClean="0"/>
-              <a:t>11/22/2017</a:t>
+              <a:t>11/16/2017</a:t>
             </a:fld>
             <a:endParaRPr lang="en-US"/>
           </a:p>
@@ -1774,7 +1773,7 @@
           <a:p>
             <a:fld id="{61FD3517-842E-4A76-9AF7-7F80C1AFB4A2}" type="datetimeFigureOut">
               <a:rPr lang="en-US" smtClean="0"/>
-              <a:t>11/22/2017</a:t>
+              <a:t>11/16/2017</a:t>
             </a:fld>
             <a:endParaRPr lang="en-US"/>
           </a:p>
@@ -1892,7 +1891,7 @@
           <a:p>
             <a:fld id="{61FD3517-842E-4A76-9AF7-7F80C1AFB4A2}" type="datetimeFigureOut">
               <a:rPr lang="en-US" smtClean="0"/>
-              <a:t>11/22/2017</a:t>
+              <a:t>11/16/2017</a:t>
             </a:fld>
             <a:endParaRPr lang="en-US"/>
           </a:p>
@@ -1987,7 +1986,7 @@
           <a:p>
             <a:fld id="{61FD3517-842E-4A76-9AF7-7F80C1AFB4A2}" type="datetimeFigureOut">
               <a:rPr lang="en-US" smtClean="0"/>
-              <a:t>11/22/2017</a:t>
+              <a:t>11/16/2017</a:t>
             </a:fld>
             <a:endParaRPr lang="en-US"/>
           </a:p>
@@ -2264,7 +2263,7 @@
           <a:p>
             <a:fld id="{61FD3517-842E-4A76-9AF7-7F80C1AFB4A2}" type="datetimeFigureOut">
               <a:rPr lang="en-US" smtClean="0"/>
-              <a:t>11/22/2017</a:t>
+              <a:t>11/16/2017</a:t>
             </a:fld>
             <a:endParaRPr lang="en-US"/>
           </a:p>
@@ -2517,7 +2516,7 @@
           <a:p>
             <a:fld id="{61FD3517-842E-4A76-9AF7-7F80C1AFB4A2}" type="datetimeFigureOut">
               <a:rPr lang="en-US" smtClean="0"/>
-              <a:t>11/22/2017</a:t>
+              <a:t>11/16/2017</a:t>
             </a:fld>
             <a:endParaRPr lang="en-US"/>
           </a:p>
@@ -2730,7 +2729,7 @@
           <a:p>
             <a:fld id="{61FD3517-842E-4A76-9AF7-7F80C1AFB4A2}" type="datetimeFigureOut">
               <a:rPr lang="en-US" smtClean="0"/>
-              <a:t>11/22/2017</a:t>
+              <a:t>11/16/2017</a:t>
             </a:fld>
             <a:endParaRPr lang="en-US"/>
           </a:p>
@@ -3091,16 +3090,6 @@
 <file path=ppt/slides/slide1.xml><?xml version="1.0" encoding="utf-8"?>
 <p:sld xmlns:a="http://schemas.openxmlformats.org/drawingml/2006/main" xmlns:r="http://schemas.openxmlformats.org/officeDocument/2006/relationships" xmlns:p="http://schemas.openxmlformats.org/presentationml/2006/main">
   <p:cSld>
-    <p:bg>
-      <p:bgPr>
-        <a:solidFill>
-          <a:schemeClr val="bg1">
-            <a:lumMod val="85000"/>
-          </a:schemeClr>
-        </a:solidFill>
-        <a:effectLst/>
-      </p:bgPr>
-    </p:bg>
     <p:spTree>
       <p:nvGrpSpPr>
         <p:cNvPr id="1" name=""/>
@@ -3117,44 +3106,29 @@
       </p:grpSpPr>
       <p:sp>
         <p:nvSpPr>
-          <p:cNvPr id="4" name="Rectangle 3"/>
-          <p:cNvSpPr/>
-          <p:nvPr/>
+          <p:cNvPr id="2" name="Title 1"/>
+          <p:cNvSpPr>
+            <a:spLocks noGrp="1"/>
+          </p:cNvSpPr>
+          <p:nvPr>
+            <p:ph type="ctrTitle"/>
+          </p:nvPr>
         </p:nvSpPr>
         <p:spPr>
           <a:xfrm>
-            <a:off x="0" y="1047750"/>
-            <a:ext cx="9144000" cy="3048000"/>
+            <a:off x="685800" y="1276350"/>
+            <a:ext cx="7772400" cy="1102519"/>
           </a:xfrm>
-          <a:prstGeom prst="rect">
-            <a:avLst/>
-          </a:prstGeom>
-          <a:ln>
-            <a:noFill/>
-          </a:ln>
         </p:spPr>
-        <p:style>
-          <a:lnRef idx="2">
-            <a:schemeClr val="accent1">
-              <a:shade val="50000"/>
-            </a:schemeClr>
-          </a:lnRef>
-          <a:fillRef idx="1">
-            <a:schemeClr val="accent1"/>
-          </a:fillRef>
-          <a:effectRef idx="0">
-            <a:schemeClr val="accent1"/>
-          </a:effectRef>
-          <a:fontRef idx="minor">
-            <a:schemeClr val="lt1"/>
-          </a:fontRef>
-        </p:style>
-        <p:txBody>
-          <a:bodyPr rtlCol="0" anchor="ctr"/>
-          <a:lstStyle/>
-          <a:p>
-            <a:pPr algn="ctr"/>
-            <a:endParaRPr lang="en-US"/>
+        <p:txBody>
+          <a:bodyPr/>
+          <a:lstStyle/>
+          <a:p>
+            <a:r>
+              <a:rPr lang="en-US" dirty="0" smtClean="0"/>
+              <a:t>Tips for CS Freshmen</a:t>
+            </a:r>
+            <a:endParaRPr lang="en-US" dirty="0"/>
           </a:p>
         </p:txBody>
       </p:sp>
@@ -3170,527 +3144,36 @@
         </p:nvSpPr>
         <p:spPr>
           <a:xfrm>
-            <a:off x="152400" y="3714750"/>
-            <a:ext cx="6400800" cy="1314450"/>
+            <a:off x="1371600" y="3257550"/>
+            <a:ext cx="6400800" cy="971550"/>
           </a:xfrm>
         </p:spPr>
         <p:txBody>
-          <a:bodyPr>
-            <a:normAutofit fontScale="85000" lnSpcReduction="20000"/>
-          </a:bodyPr>
-          <a:lstStyle/>
-          <a:p>
-            <a:pPr algn="l"/>
-            <a:r>
-              <a:rPr lang="en-US" b="1" dirty="0" smtClean="0">
-                <a:solidFill>
-                  <a:srgbClr val="FFC000"/>
-                </a:solidFill>
-              </a:rPr>
-              <a:t>Joe James</a:t>
-            </a:r>
-          </a:p>
-          <a:p>
-            <a:pPr algn="l"/>
-            <a:r>
-              <a:rPr lang="en-US" b="1" dirty="0" smtClean="0">
-                <a:solidFill>
-                  <a:schemeClr val="tx1">
-                    <a:lumMod val="65000"/>
-                    <a:lumOff val="35000"/>
-                  </a:schemeClr>
-                </a:solidFill>
-              </a:rPr>
-              <a:t>Math &amp; Computer Science Tutorials</a:t>
-            </a:r>
-          </a:p>
-          <a:p>
-            <a:pPr algn="l"/>
-            <a:r>
-              <a:rPr lang="en-US" sz="2800" b="1" dirty="0">
-                <a:solidFill>
-                  <a:schemeClr val="tx1">
-                    <a:lumMod val="65000"/>
-                    <a:lumOff val="35000"/>
-                  </a:schemeClr>
-                </a:solidFill>
-              </a:rPr>
-              <a:t>f</a:t>
-            </a:r>
-            <a:r>
-              <a:rPr lang="en-US" sz="2800" b="1" dirty="0" smtClean="0">
-                <a:solidFill>
-                  <a:schemeClr val="tx1">
-                    <a:lumMod val="65000"/>
-                    <a:lumOff val="35000"/>
-                  </a:schemeClr>
-                </a:solidFill>
-              </a:rPr>
-              <a:t>rom Silicon Valley</a:t>
-            </a:r>
-            <a:endParaRPr lang="en-US" sz="2800" b="1" dirty="0">
-              <a:solidFill>
-                <a:schemeClr val="tx1">
-                  <a:lumMod val="65000"/>
-                  <a:lumOff val="35000"/>
-                </a:schemeClr>
-              </a:solidFill>
-            </a:endParaRPr>
-          </a:p>
-        </p:txBody>
-      </p:sp>
-      <p:sp>
-        <p:nvSpPr>
-          <p:cNvPr id="5" name="Title 1"/>
-          <p:cNvSpPr txBox="1">
-            <a:spLocks/>
-          </p:cNvSpPr>
-          <p:nvPr/>
-        </p:nvSpPr>
-        <p:spPr>
-          <a:xfrm>
-            <a:off x="228600" y="7681"/>
-            <a:ext cx="8686800" cy="1040069"/>
-          </a:xfrm>
-          <a:prstGeom prst="rect">
-            <a:avLst/>
-          </a:prstGeom>
-        </p:spPr>
-        <p:txBody>
-          <a:bodyPr vert="horz" lIns="91440" tIns="45720" rIns="91440" bIns="45720" rtlCol="0" anchor="ctr">
-            <a:noAutofit/>
-          </a:bodyPr>
-          <a:lstStyle>
-            <a:lvl1pPr algn="ctr" defTabSz="914400" rtl="0" eaLnBrk="1" latinLnBrk="0" hangingPunct="1">
-              <a:spcBef>
-                <a:spcPct val="0"/>
-              </a:spcBef>
-              <a:buNone/>
-              <a:defRPr sz="4400" kern="1200">
-                <a:solidFill>
-                  <a:schemeClr val="tx1"/>
-                </a:solidFill>
-                <a:latin typeface="+mj-lt"/>
-                <a:ea typeface="+mj-ea"/>
-                <a:cs typeface="+mj-cs"/>
-              </a:defRPr>
-            </a:lvl1pPr>
-          </a:lstStyle>
-          <a:p>
-            <a:endParaRPr lang="en-US" sz="8000" b="1" dirty="0">
-              <a:solidFill>
-                <a:schemeClr val="tx1">
-                  <a:lumMod val="65000"/>
-                  <a:lumOff val="35000"/>
-                </a:schemeClr>
-              </a:solidFill>
-            </a:endParaRPr>
-          </a:p>
-        </p:txBody>
-      </p:sp>
-      <p:sp>
-        <p:nvSpPr>
-          <p:cNvPr id="2" name="Title 1"/>
-          <p:cNvSpPr>
-            <a:spLocks noGrp="1"/>
-          </p:cNvSpPr>
-          <p:nvPr>
-            <p:ph type="ctrTitle"/>
-          </p:nvPr>
-        </p:nvSpPr>
-        <p:spPr>
-          <a:xfrm>
-            <a:off x="152400" y="1110201"/>
-            <a:ext cx="8839200" cy="2452150"/>
-          </a:xfrm>
-        </p:spPr>
-        <p:txBody>
-          <a:bodyPr>
-            <a:noAutofit/>
-          </a:bodyPr>
-          <a:lstStyle/>
-          <a:p>
-            <a:r>
-              <a:rPr lang="en-US" sz="8000" b="1" dirty="0" smtClean="0">
-                <a:solidFill>
-                  <a:schemeClr val="bg1"/>
-                </a:solidFill>
-                <a:latin typeface="Segoe UI Black" pitchFamily="34" charset="0"/>
-                <a:ea typeface="Segoe UI Black" pitchFamily="34" charset="0"/>
-                <a:cs typeface="Segoe UI Black" pitchFamily="34" charset="0"/>
-              </a:rPr>
-              <a:t>Tips for CS</a:t>
-            </a:r>
-            <a:br>
-              <a:rPr lang="en-US" sz="8000" b="1" dirty="0" smtClean="0">
-                <a:solidFill>
-                  <a:schemeClr val="bg1"/>
-                </a:solidFill>
-                <a:latin typeface="Segoe UI Black" pitchFamily="34" charset="0"/>
-                <a:ea typeface="Segoe UI Black" pitchFamily="34" charset="0"/>
-                <a:cs typeface="Segoe UI Black" pitchFamily="34" charset="0"/>
-              </a:rPr>
-            </a:br>
-            <a:r>
-              <a:rPr lang="en-US" sz="8000" b="1" dirty="0" smtClean="0">
-                <a:solidFill>
-                  <a:schemeClr val="bg1"/>
-                </a:solidFill>
-                <a:latin typeface="Segoe UI Black" pitchFamily="34" charset="0"/>
-                <a:ea typeface="Segoe UI Black" pitchFamily="34" charset="0"/>
-                <a:cs typeface="Segoe UI Black" pitchFamily="34" charset="0"/>
-              </a:rPr>
-              <a:t>Freshmen</a:t>
-            </a:r>
-            <a:endParaRPr lang="en-US" sz="8000" b="1" dirty="0">
-              <a:solidFill>
-                <a:schemeClr val="bg1"/>
-              </a:solidFill>
-              <a:latin typeface="Segoe UI Black" pitchFamily="34" charset="0"/>
-              <a:ea typeface="Segoe UI Black" pitchFamily="34" charset="0"/>
-              <a:cs typeface="Segoe UI Black" pitchFamily="34" charset="0"/>
-            </a:endParaRPr>
+          <a:bodyPr/>
+          <a:lstStyle/>
+          <a:p>
+            <a:r>
+              <a:rPr lang="en-US" dirty="0" smtClean="0"/>
+              <a:t>Nov 2017</a:t>
+            </a:r>
+            <a:endParaRPr lang="en-US" dirty="0"/>
           </a:p>
         </p:txBody>
       </p:sp>
     </p:spTree>
     <p:extLst>
       <p:ext uri="{BB962C8B-B14F-4D97-AF65-F5344CB8AC3E}">
-        <p14:creationId xmlns:p14="http://schemas.microsoft.com/office/powerpoint/2010/main" val="2071849003"/>
+        <p14:creationId xmlns:p14="http://schemas.microsoft.com/office/powerpoint/2010/main" val="2292588759"/>
       </p:ext>
     </p:extLst>
   </p:cSld>
   <p:clrMapOvr>
     <a:masterClrMapping/>
   </p:clrMapOvr>
-  <p:timing>
-    <p:tnLst>
-      <p:par>
-        <p:cTn id="1" dur="indefinite" restart="never" nodeType="tmRoot"/>
-      </p:par>
-    </p:tnLst>
-  </p:timing>
 </p:sld>
 </file>
 
 <file path=ppt/slides/slide10.xml><?xml version="1.0" encoding="utf-8"?>
-<p:sld xmlns:a="http://schemas.openxmlformats.org/drawingml/2006/main" xmlns:r="http://schemas.openxmlformats.org/officeDocument/2006/relationships" xmlns:p="http://schemas.openxmlformats.org/presentationml/2006/main">
-  <p:cSld>
-    <p:spTree>
-      <p:nvGrpSpPr>
-        <p:cNvPr id="1" name=""/>
-        <p:cNvGrpSpPr/>
-        <p:nvPr/>
-      </p:nvGrpSpPr>
-      <p:grpSpPr>
-        <a:xfrm>
-          <a:off x="0" y="0"/>
-          <a:ext cx="0" cy="0"/>
-          <a:chOff x="0" y="0"/>
-          <a:chExt cx="0" cy="0"/>
-        </a:xfrm>
-      </p:grpSpPr>
-      <p:sp>
-        <p:nvSpPr>
-          <p:cNvPr id="2" name="Title 1"/>
-          <p:cNvSpPr>
-            <a:spLocks noGrp="1"/>
-          </p:cNvSpPr>
-          <p:nvPr>
-            <p:ph type="title"/>
-          </p:nvPr>
-        </p:nvSpPr>
-        <p:spPr/>
-        <p:txBody>
-          <a:bodyPr/>
-          <a:lstStyle/>
-          <a:p>
-            <a:r>
-              <a:rPr lang="en-US" dirty="0" smtClean="0"/>
-              <a:t>Use a Variety of Learning Media</a:t>
-            </a:r>
-            <a:endParaRPr lang="en-US" dirty="0"/>
-          </a:p>
-        </p:txBody>
-      </p:sp>
-      <p:sp>
-        <p:nvSpPr>
-          <p:cNvPr id="3" name="Content Placeholder 2"/>
-          <p:cNvSpPr>
-            <a:spLocks noGrp="1"/>
-          </p:cNvSpPr>
-          <p:nvPr>
-            <p:ph idx="1"/>
-          </p:nvPr>
-        </p:nvSpPr>
-        <p:spPr>
-          <a:xfrm>
-            <a:off x="457200" y="1200151"/>
-            <a:ext cx="4038600" cy="3394472"/>
-          </a:xfrm>
-        </p:spPr>
-        <p:txBody>
-          <a:bodyPr>
-            <a:normAutofit lnSpcReduction="10000"/>
-          </a:bodyPr>
-          <a:lstStyle/>
-          <a:p>
-            <a:r>
-              <a:rPr lang="en-US" sz="2800" dirty="0" smtClean="0"/>
-              <a:t>Class lectures</a:t>
-            </a:r>
-          </a:p>
-          <a:p>
-            <a:r>
-              <a:rPr lang="en-US" sz="2800" dirty="0" smtClean="0"/>
-              <a:t>Text books</a:t>
-            </a:r>
-          </a:p>
-          <a:p>
-            <a:r>
-              <a:rPr lang="en-US" sz="2800" dirty="0" smtClean="0"/>
-              <a:t>Homework</a:t>
-            </a:r>
-          </a:p>
-          <a:p>
-            <a:r>
-              <a:rPr lang="en-US" sz="2800" dirty="0" smtClean="0"/>
-              <a:t>YouTube videos</a:t>
-            </a:r>
-          </a:p>
-          <a:p>
-            <a:r>
-              <a:rPr lang="en-US" sz="2800" dirty="0" smtClean="0"/>
-              <a:t>Official language docs</a:t>
-            </a:r>
-          </a:p>
-          <a:p>
-            <a:r>
-              <a:rPr lang="en-US" sz="2800" dirty="0" err="1" smtClean="0"/>
-              <a:t>StackOverflow</a:t>
-            </a:r>
-            <a:r>
-              <a:rPr lang="en-US" sz="2800" dirty="0" smtClean="0"/>
-              <a:t> &amp; other forums</a:t>
-            </a:r>
-          </a:p>
-        </p:txBody>
-      </p:sp>
-      <p:sp>
-        <p:nvSpPr>
-          <p:cNvPr id="4" name="Content Placeholder 2"/>
-          <p:cNvSpPr txBox="1">
-            <a:spLocks/>
-          </p:cNvSpPr>
-          <p:nvPr/>
-        </p:nvSpPr>
-        <p:spPr>
-          <a:xfrm>
-            <a:off x="4724400" y="1200150"/>
-            <a:ext cx="4038600" cy="3394472"/>
-          </a:xfrm>
-          <a:prstGeom prst="rect">
-            <a:avLst/>
-          </a:prstGeom>
-        </p:spPr>
-        <p:txBody>
-          <a:bodyPr vert="horz" lIns="91440" tIns="45720" rIns="91440" bIns="45720" rtlCol="0">
-            <a:normAutofit/>
-          </a:bodyPr>
-          <a:lstStyle>
-            <a:lvl1pPr marL="342900" indent="-342900" algn="l" defTabSz="914400" rtl="0" eaLnBrk="1" latinLnBrk="0" hangingPunct="1">
-              <a:spcBef>
-                <a:spcPct val="20000"/>
-              </a:spcBef>
-              <a:buFont typeface="Arial" pitchFamily="34" charset="0"/>
-              <a:buChar char="•"/>
-              <a:defRPr sz="3200" kern="1200">
-                <a:solidFill>
-                  <a:schemeClr val="tx1"/>
-                </a:solidFill>
-                <a:latin typeface="+mn-lt"/>
-                <a:ea typeface="+mn-ea"/>
-                <a:cs typeface="+mn-cs"/>
-              </a:defRPr>
-            </a:lvl1pPr>
-            <a:lvl2pPr marL="742950" indent="-285750" algn="l" defTabSz="914400" rtl="0" eaLnBrk="1" latinLnBrk="0" hangingPunct="1">
-              <a:spcBef>
-                <a:spcPct val="20000"/>
-              </a:spcBef>
-              <a:buFont typeface="Arial" pitchFamily="34" charset="0"/>
-              <a:buChar char="–"/>
-              <a:defRPr sz="2800" kern="1200">
-                <a:solidFill>
-                  <a:schemeClr val="tx1"/>
-                </a:solidFill>
-                <a:latin typeface="+mn-lt"/>
-                <a:ea typeface="+mn-ea"/>
-                <a:cs typeface="+mn-cs"/>
-              </a:defRPr>
-            </a:lvl2pPr>
-            <a:lvl3pPr marL="1143000" indent="-228600" algn="l" defTabSz="914400" rtl="0" eaLnBrk="1" latinLnBrk="0" hangingPunct="1">
-              <a:spcBef>
-                <a:spcPct val="20000"/>
-              </a:spcBef>
-              <a:buFont typeface="Arial" pitchFamily="34" charset="0"/>
-              <a:buChar char="•"/>
-              <a:defRPr sz="2400" kern="1200">
-                <a:solidFill>
-                  <a:schemeClr val="tx1"/>
-                </a:solidFill>
-                <a:latin typeface="+mn-lt"/>
-                <a:ea typeface="+mn-ea"/>
-                <a:cs typeface="+mn-cs"/>
-              </a:defRPr>
-            </a:lvl3pPr>
-            <a:lvl4pPr marL="1600200" indent="-228600" algn="l" defTabSz="914400" rtl="0" eaLnBrk="1" latinLnBrk="0" hangingPunct="1">
-              <a:spcBef>
-                <a:spcPct val="20000"/>
-              </a:spcBef>
-              <a:buFont typeface="Arial" pitchFamily="34" charset="0"/>
-              <a:buChar char="–"/>
-              <a:defRPr sz="2000" kern="1200">
-                <a:solidFill>
-                  <a:schemeClr val="tx1"/>
-                </a:solidFill>
-                <a:latin typeface="+mn-lt"/>
-                <a:ea typeface="+mn-ea"/>
-                <a:cs typeface="+mn-cs"/>
-              </a:defRPr>
-            </a:lvl4pPr>
-            <a:lvl5pPr marL="2057400" indent="-228600" algn="l" defTabSz="914400" rtl="0" eaLnBrk="1" latinLnBrk="0" hangingPunct="1">
-              <a:spcBef>
-                <a:spcPct val="20000"/>
-              </a:spcBef>
-              <a:buFont typeface="Arial" pitchFamily="34" charset="0"/>
-              <a:buChar char="»"/>
-              <a:defRPr sz="2000" kern="1200">
-                <a:solidFill>
-                  <a:schemeClr val="tx1"/>
-                </a:solidFill>
-                <a:latin typeface="+mn-lt"/>
-                <a:ea typeface="+mn-ea"/>
-                <a:cs typeface="+mn-cs"/>
-              </a:defRPr>
-            </a:lvl5pPr>
-            <a:lvl6pPr marL="2514600" indent="-228600" algn="l" defTabSz="914400" rtl="0" eaLnBrk="1" latinLnBrk="0" hangingPunct="1">
-              <a:spcBef>
-                <a:spcPct val="20000"/>
-              </a:spcBef>
-              <a:buFont typeface="Arial" pitchFamily="34" charset="0"/>
-              <a:buChar char="•"/>
-              <a:defRPr sz="2000" kern="1200">
-                <a:solidFill>
-                  <a:schemeClr val="tx1"/>
-                </a:solidFill>
-                <a:latin typeface="+mn-lt"/>
-                <a:ea typeface="+mn-ea"/>
-                <a:cs typeface="+mn-cs"/>
-              </a:defRPr>
-            </a:lvl6pPr>
-            <a:lvl7pPr marL="2971800" indent="-228600" algn="l" defTabSz="914400" rtl="0" eaLnBrk="1" latinLnBrk="0" hangingPunct="1">
-              <a:spcBef>
-                <a:spcPct val="20000"/>
-              </a:spcBef>
-              <a:buFont typeface="Arial" pitchFamily="34" charset="0"/>
-              <a:buChar char="•"/>
-              <a:defRPr sz="2000" kern="1200">
-                <a:solidFill>
-                  <a:schemeClr val="tx1"/>
-                </a:solidFill>
-                <a:latin typeface="+mn-lt"/>
-                <a:ea typeface="+mn-ea"/>
-                <a:cs typeface="+mn-cs"/>
-              </a:defRPr>
-            </a:lvl7pPr>
-            <a:lvl8pPr marL="3429000" indent="-228600" algn="l" defTabSz="914400" rtl="0" eaLnBrk="1" latinLnBrk="0" hangingPunct="1">
-              <a:spcBef>
-                <a:spcPct val="20000"/>
-              </a:spcBef>
-              <a:buFont typeface="Arial" pitchFamily="34" charset="0"/>
-              <a:buChar char="•"/>
-              <a:defRPr sz="2000" kern="1200">
-                <a:solidFill>
-                  <a:schemeClr val="tx1"/>
-                </a:solidFill>
-                <a:latin typeface="+mn-lt"/>
-                <a:ea typeface="+mn-ea"/>
-                <a:cs typeface="+mn-cs"/>
-              </a:defRPr>
-            </a:lvl8pPr>
-            <a:lvl9pPr marL="3886200" indent="-228600" algn="l" defTabSz="914400" rtl="0" eaLnBrk="1" latinLnBrk="0" hangingPunct="1">
-              <a:spcBef>
-                <a:spcPct val="20000"/>
-              </a:spcBef>
-              <a:buFont typeface="Arial" pitchFamily="34" charset="0"/>
-              <a:buChar char="•"/>
-              <a:defRPr sz="2000" kern="1200">
-                <a:solidFill>
-                  <a:schemeClr val="tx1"/>
-                </a:solidFill>
-                <a:latin typeface="+mn-lt"/>
-                <a:ea typeface="+mn-ea"/>
-                <a:cs typeface="+mn-cs"/>
-              </a:defRPr>
-            </a:lvl9pPr>
-          </a:lstStyle>
-          <a:p>
-            <a:r>
-              <a:rPr lang="en-US" sz="2800" dirty="0"/>
-              <a:t>Solo projects</a:t>
-            </a:r>
-          </a:p>
-          <a:p>
-            <a:r>
-              <a:rPr lang="en-US" sz="2800" dirty="0" smtClean="0"/>
-              <a:t>Team </a:t>
-            </a:r>
-            <a:r>
-              <a:rPr lang="en-US" sz="2800" dirty="0"/>
-              <a:t>projects</a:t>
-            </a:r>
-          </a:p>
-          <a:p>
-            <a:r>
-              <a:rPr lang="en-US" sz="2800" dirty="0" smtClean="0"/>
-              <a:t>Coding challenges and </a:t>
-            </a:r>
-            <a:r>
-              <a:rPr lang="en-US" sz="2800" dirty="0" err="1" smtClean="0"/>
-              <a:t>hackathons</a:t>
-            </a:r>
-            <a:endParaRPr lang="en-US" sz="2800" dirty="0" smtClean="0"/>
-          </a:p>
-          <a:p>
-            <a:r>
-              <a:rPr lang="en-US" sz="2800" dirty="0" smtClean="0"/>
-              <a:t>Internships</a:t>
-            </a:r>
-            <a:endParaRPr lang="en-US" sz="2800" dirty="0"/>
-          </a:p>
-        </p:txBody>
-      </p:sp>
-    </p:spTree>
-    <p:extLst>
-      <p:ext uri="{BB962C8B-B14F-4D97-AF65-F5344CB8AC3E}">
-        <p14:creationId xmlns:p14="http://schemas.microsoft.com/office/powerpoint/2010/main" val="2856881644"/>
-      </p:ext>
-    </p:extLst>
-  </p:cSld>
-  <p:clrMapOvr>
-    <a:masterClrMapping/>
-  </p:clrMapOvr>
-  <p:timing>
-    <p:tnLst>
-      <p:par>
-        <p:cTn id="1" dur="indefinite" restart="never" nodeType="tmRoot"/>
-      </p:par>
-    </p:tnLst>
-  </p:timing>
-</p:sld>
-</file>
-
-<file path=ppt/slides/slide11.xml><?xml version="1.0" encoding="utf-8"?>
 <p:sld xmlns:a="http://schemas.openxmlformats.org/drawingml/2006/main" xmlns:r="http://schemas.openxmlformats.org/officeDocument/2006/relationships" xmlns:p="http://schemas.openxmlformats.org/presentationml/2006/main">
   <p:cSld>
     <p:spTree>
@@ -3956,21 +3439,22 @@
             <p:ph idx="1"/>
           </p:nvPr>
         </p:nvSpPr>
-        <p:spPr>
-          <a:xfrm>
-            <a:off x="457200" y="1200151"/>
-            <a:ext cx="7696200" cy="3394472"/>
-          </a:xfrm>
-        </p:spPr>
-        <p:txBody>
-          <a:bodyPr>
-            <a:normAutofit/>
-          </a:bodyPr>
-          <a:lstStyle/>
-          <a:p>
-            <a:r>
-              <a:rPr lang="en-US" dirty="0" smtClean="0"/>
-              <a:t>Top 5: Python, </a:t>
+        <p:spPr/>
+        <p:txBody>
+          <a:bodyPr/>
+          <a:lstStyle/>
+          <a:p>
+            <a:r>
+              <a:rPr lang="en-US" dirty="0" smtClean="0"/>
+              <a:t>Top 5: </a:t>
+            </a:r>
+            <a:r>
+              <a:rPr lang="en-US" dirty="0" smtClean="0"/>
+              <a:t>Python</a:t>
+            </a:r>
+            <a:r>
+              <a:rPr lang="en-US" dirty="0" smtClean="0"/>
+              <a:t>, </a:t>
             </a:r>
             <a:r>
               <a:rPr lang="en-US" dirty="0" err="1" smtClean="0"/>
@@ -3986,8 +3470,17 @@
             </a:r>
             <a:r>
               <a:rPr lang="en-US" dirty="0" smtClean="0"/>
-              <a:t>C++, C# (and SQL) </a:t>
-            </a:r>
+              <a:t>C</a:t>
+            </a:r>
+            <a:r>
+              <a:rPr lang="en-US" dirty="0" smtClean="0"/>
+              <a:t>++, </a:t>
+            </a:r>
+            <a:r>
+              <a:rPr lang="en-US" dirty="0" smtClean="0"/>
+              <a:t>C# </a:t>
+            </a:r>
+            <a:endParaRPr lang="en-US" dirty="0" smtClean="0"/>
           </a:p>
           <a:p>
             <a:r>
@@ -3998,7 +3491,7 @@
           <a:p>
             <a:r>
               <a:rPr lang="en-US" dirty="0" smtClean="0"/>
-              <a:t>Use variety of learning media</a:t>
+              <a:t>Watch on-line videos</a:t>
             </a:r>
           </a:p>
           <a:p>
@@ -4374,7 +3867,11 @@
           <a:p>
             <a:r>
               <a:rPr lang="en-US" dirty="0" smtClean="0"/>
-              <a:t>Focus on sharpening your skills, gaining useful experience  &amp; building relationships</a:t>
+              <a:t>Focus on sharpening your </a:t>
+            </a:r>
+            <a:r>
+              <a:rPr lang="en-US" dirty="0" smtClean="0"/>
+              <a:t>skills, gaining useful experience  &amp; building relationships</a:t>
             </a:r>
             <a:endParaRPr lang="en-US" dirty="0"/>
           </a:p>
@@ -4390,13 +3887,6 @@
   <p:clrMapOvr>
     <a:masterClrMapping/>
   </p:clrMapOvr>
-  <p:timing>
-    <p:tnLst>
-      <p:par>
-        <p:cTn id="1" dur="indefinite" restart="never" nodeType="tmRoot"/>
-      </p:par>
-    </p:tnLst>
-  </p:timing>
 </p:sld>
 </file>
 
@@ -4479,12 +3969,6 @@
               <a:t>Mobile apps</a:t>
             </a:r>
           </a:p>
-          <a:p>
-            <a:r>
-              <a:rPr lang="en-US" dirty="0" smtClean="0"/>
-              <a:t>Internship projects</a:t>
-            </a:r>
-          </a:p>
         </p:txBody>
       </p:sp>
     </p:spTree>
@@ -4497,13 +3981,6 @@
   <p:clrMapOvr>
     <a:masterClrMapping/>
   </p:clrMapOvr>
-  <p:timing>
-    <p:tnLst>
-      <p:par>
-        <p:cTn id="1" dur="indefinite" restart="never" nodeType="tmRoot"/>
-      </p:par>
-    </p:tnLst>
-  </p:timing>
 </p:sld>
 </file>
 
@@ -4576,7 +4053,11 @@
           <a:p>
             <a:r>
               <a:rPr lang="en-US" dirty="0" smtClean="0"/>
-              <a:t>Collaborate with smart classmates on projects</a:t>
+              <a:t>Collaborate with smart classmates on </a:t>
+            </a:r>
+            <a:r>
+              <a:rPr lang="en-US" dirty="0" smtClean="0"/>
+              <a:t>projects</a:t>
             </a:r>
           </a:p>
           <a:p>
@@ -4598,13 +4079,6 @@
   <p:clrMapOvr>
     <a:masterClrMapping/>
   </p:clrMapOvr>
-  <p:timing>
-    <p:tnLst>
-      <p:par>
-        <p:cTn id="1" dur="indefinite" restart="never" nodeType="tmRoot"/>
-      </p:par>
-    </p:tnLst>
-  </p:timing>
 </p:sld>
 </file>
 

</xml_diff>